<commit_message>
Site updated: 2016-09-22 15:38:13
</commit_message>
<xml_diff>
--- a/ppt/Klass.pptx
+++ b/ppt/Klass.pptx
@@ -6,6 +6,7 @@
   </p:sldMasterIdLst>
   <p:sldIdLst>
     <p:sldId id="256" r:id="rId2"/>
+    <p:sldId id="257" r:id="rId3"/>
   </p:sldIdLst>
   <p:sldSz cx="9144000" cy="6858000" type="screen4x3"/>
   <p:notesSz cx="6858000" cy="9144000"/>
@@ -3103,8 +3104,8 @@
         </p:nvSpPr>
         <p:spPr>
           <a:xfrm>
-            <a:off x="323528" y="1340768"/>
-            <a:ext cx="8496944" cy="5184576"/>
+            <a:off x="2843808" y="1340768"/>
+            <a:ext cx="2952328" cy="3456384"/>
           </a:xfrm>
           <a:prstGeom prst="roundRect">
             <a:avLst>
@@ -3155,16 +3156,31 @@
             <p:ph type="title"/>
           </p:nvPr>
         </p:nvSpPr>
-        <p:spPr/>
-        <p:txBody>
-          <a:bodyPr/>
-          <a:lstStyle/>
-          <a:p>
-            <a:r>
-              <a:rPr lang="en-US" altLang="zh-CN" dirty="0" smtClean="0"/>
+        <p:spPr>
+          <a:xfrm>
+            <a:off x="3635896" y="1196752"/>
+            <a:ext cx="1368152" cy="792088"/>
+          </a:xfrm>
+        </p:spPr>
+        <p:txBody>
+          <a:bodyPr>
+            <a:normAutofit/>
+          </a:bodyPr>
+          <a:lstStyle/>
+          <a:p>
+            <a:r>
+              <a:rPr lang="en-US" altLang="zh-CN" sz="2800" b="1" dirty="0" smtClean="0">
+                <a:solidFill>
+                  <a:srgbClr val="002060"/>
+                </a:solidFill>
+              </a:rPr>
               <a:t>Klass</a:t>
             </a:r>
-            <a:endParaRPr lang="zh-CN" altLang="en-US" dirty="0"/>
+            <a:endParaRPr lang="zh-CN" altLang="en-US" sz="2800" b="1" dirty="0">
+              <a:solidFill>
+                <a:srgbClr val="002060"/>
+              </a:solidFill>
+            </a:endParaRPr>
           </a:p>
         </p:txBody>
       </p:sp>
@@ -3191,7 +3207,7 @@
         </p:blipFill>
         <p:spPr bwMode="auto">
           <a:xfrm>
-            <a:off x="8210872" y="381527"/>
+            <a:off x="5182716" y="1356048"/>
             <a:ext cx="609600" cy="609600"/>
           </a:xfrm>
           <a:prstGeom prst="rect">
@@ -3217,7 +3233,7 @@
         </p:nvSpPr>
         <p:spPr>
           <a:xfrm>
-            <a:off x="827584" y="1988840"/>
+            <a:off x="3639716" y="3941632"/>
             <a:ext cx="1440160" cy="720080"/>
           </a:xfrm>
           <a:prstGeom prst="roundRect">
@@ -3277,7 +3293,7 @@
         </p:nvSpPr>
         <p:spPr>
           <a:xfrm>
-            <a:off x="2771800" y="1968007"/>
+            <a:off x="3635896" y="2967434"/>
             <a:ext cx="1440160" cy="720080"/>
           </a:xfrm>
           <a:prstGeom prst="roundRect">
@@ -3337,7 +3353,7 @@
         </p:nvSpPr>
         <p:spPr>
           <a:xfrm>
-            <a:off x="4581922" y="1916832"/>
+            <a:off x="3635896" y="1988840"/>
             <a:ext cx="1440160" cy="720080"/>
           </a:xfrm>
           <a:prstGeom prst="roundRect">
@@ -3389,6 +3405,85 @@
           </a:p>
         </p:txBody>
       </p:sp>
+      <p:cxnSp>
+        <p:nvCxnSpPr>
+          <p:cNvPr id="10" name="直接箭头连接符 9"/>
+          <p:cNvCxnSpPr>
+            <a:stCxn id="8" idx="0"/>
+            <a:endCxn id="9" idx="2"/>
+          </p:cNvCxnSpPr>
+          <p:nvPr/>
+        </p:nvCxnSpPr>
+        <p:spPr>
+          <a:xfrm flipV="1">
+            <a:off x="4355976" y="2708920"/>
+            <a:ext cx="0" cy="258514"/>
+          </a:xfrm>
+          <a:prstGeom prst="straightConnector1">
+            <a:avLst/>
+          </a:prstGeom>
+          <a:ln w="47625" cmpd="sng">
+            <a:solidFill>
+              <a:srgbClr val="002060"/>
+            </a:solidFill>
+            <a:headEnd type="none" w="lg" len="med"/>
+            <a:tailEnd type="triangle" w="lg" len="med"/>
+          </a:ln>
+        </p:spPr>
+        <p:style>
+          <a:lnRef idx="1">
+            <a:schemeClr val="accent1"/>
+          </a:lnRef>
+          <a:fillRef idx="0">
+            <a:schemeClr val="accent1"/>
+          </a:fillRef>
+          <a:effectRef idx="0">
+            <a:schemeClr val="accent1"/>
+          </a:effectRef>
+          <a:fontRef idx="minor">
+            <a:schemeClr val="tx1"/>
+          </a:fontRef>
+        </p:style>
+      </p:cxnSp>
+      <p:cxnSp>
+        <p:nvCxnSpPr>
+          <p:cNvPr id="12" name="直接箭头连接符 11"/>
+          <p:cNvCxnSpPr>
+            <a:stCxn id="6" idx="0"/>
+          </p:cNvCxnSpPr>
+          <p:nvPr/>
+        </p:nvCxnSpPr>
+        <p:spPr>
+          <a:xfrm flipV="1">
+            <a:off x="4359796" y="3670753"/>
+            <a:ext cx="0" cy="270879"/>
+          </a:xfrm>
+          <a:prstGeom prst="straightConnector1">
+            <a:avLst/>
+          </a:prstGeom>
+          <a:ln w="47625" cmpd="sng">
+            <a:solidFill>
+              <a:srgbClr val="002060"/>
+            </a:solidFill>
+            <a:headEnd type="none" w="lg" len="med"/>
+            <a:tailEnd type="triangle" w="lg" len="med"/>
+          </a:ln>
+        </p:spPr>
+        <p:style>
+          <a:lnRef idx="1">
+            <a:schemeClr val="accent1"/>
+          </a:lnRef>
+          <a:fillRef idx="0">
+            <a:schemeClr val="accent1"/>
+          </a:fillRef>
+          <a:effectRef idx="0">
+            <a:schemeClr val="accent1"/>
+          </a:effectRef>
+          <a:fontRef idx="minor">
+            <a:schemeClr val="tx1"/>
+          </a:fontRef>
+        </p:style>
+      </p:cxnSp>
     </p:spTree>
     <p:extLst>
       <p:ext uri="{BB962C8B-B14F-4D97-AF65-F5344CB8AC3E}">
@@ -3399,6 +3494,1207 @@
   <p:clrMapOvr>
     <a:masterClrMapping/>
   </p:clrMapOvr>
+</p:sld>
+</file>
+
+<file path=ppt/slides/slide2.xml><?xml version="1.0" encoding="utf-8"?>
+<p:sld xmlns:a="http://schemas.openxmlformats.org/drawingml/2006/main" xmlns:r="http://schemas.openxmlformats.org/officeDocument/2006/relationships" xmlns:p="http://schemas.openxmlformats.org/presentationml/2006/main">
+  <p:cSld>
+    <p:spTree>
+      <p:nvGrpSpPr>
+        <p:cNvPr id="1" name=""/>
+        <p:cNvGrpSpPr/>
+        <p:nvPr/>
+      </p:nvGrpSpPr>
+      <p:grpSpPr>
+        <a:xfrm>
+          <a:off x="0" y="0"/>
+          <a:ext cx="0" cy="0"/>
+          <a:chOff x="0" y="0"/>
+          <a:chExt cx="0" cy="0"/>
+        </a:xfrm>
+      </p:grpSpPr>
+      <p:sp>
+        <p:nvSpPr>
+          <p:cNvPr id="4" name="圆角矩形 3"/>
+          <p:cNvSpPr/>
+          <p:nvPr/>
+        </p:nvSpPr>
+        <p:spPr>
+          <a:xfrm>
+            <a:off x="323528" y="44624"/>
+            <a:ext cx="6552728" cy="6048672"/>
+          </a:xfrm>
+          <a:prstGeom prst="roundRect">
+            <a:avLst>
+              <a:gd name="adj" fmla="val 3952"/>
+            </a:avLst>
+          </a:prstGeom>
+          <a:solidFill>
+            <a:schemeClr val="bg1"/>
+          </a:solidFill>
+          <a:ln>
+            <a:solidFill>
+              <a:srgbClr val="00B0F0"/>
+            </a:solidFill>
+          </a:ln>
+        </p:spPr>
+        <p:style>
+          <a:lnRef idx="2">
+            <a:schemeClr val="accent1">
+              <a:shade val="50000"/>
+            </a:schemeClr>
+          </a:lnRef>
+          <a:fillRef idx="1">
+            <a:schemeClr val="accent1"/>
+          </a:fillRef>
+          <a:effectRef idx="0">
+            <a:schemeClr val="accent1"/>
+          </a:effectRef>
+          <a:fontRef idx="minor">
+            <a:schemeClr val="lt1"/>
+          </a:fontRef>
+        </p:style>
+        <p:txBody>
+          <a:bodyPr rtlCol="0" anchor="ctr"/>
+          <a:lstStyle/>
+          <a:p>
+            <a:pPr algn="ctr"/>
+            <a:endParaRPr lang="zh-CN" altLang="en-US"/>
+          </a:p>
+        </p:txBody>
+      </p:sp>
+      <p:pic>
+        <p:nvPicPr>
+          <p:cNvPr id="1026" name="Picture 2" descr="E:\sourcecode\mygit\blog\source\img\2012052321222356.png"/>
+          <p:cNvPicPr>
+            <a:picLocks noChangeAspect="1" noChangeArrowheads="1"/>
+          </p:cNvPicPr>
+          <p:nvPr/>
+        </p:nvPicPr>
+        <p:blipFill>
+          <a:blip r:embed="rId2">
+            <a:extLst>
+              <a:ext uri="{28A0092B-C50C-407E-A947-70E740481C1C}">
+                <a14:useLocalDpi xmlns:a14="http://schemas.microsoft.com/office/drawing/2010/main" val="0"/>
+              </a:ext>
+            </a:extLst>
+          </a:blip>
+          <a:srcRect/>
+          <a:stretch>
+            <a:fillRect/>
+          </a:stretch>
+        </p:blipFill>
+        <p:spPr bwMode="auto">
+          <a:xfrm>
+            <a:off x="6482680" y="95747"/>
+            <a:ext cx="609600" cy="609600"/>
+          </a:xfrm>
+          <a:prstGeom prst="rect">
+            <a:avLst/>
+          </a:prstGeom>
+          <a:noFill/>
+          <a:extLst>
+            <a:ext uri="{909E8E84-426E-40DD-AFC4-6F175D3DCCD1}">
+              <a14:hiddenFill xmlns:a14="http://schemas.microsoft.com/office/drawing/2010/main">
+                <a:solidFill>
+                  <a:srgbClr val="FFFFFF"/>
+                </a:solidFill>
+              </a14:hiddenFill>
+            </a:ext>
+          </a:extLst>
+        </p:spPr>
+      </p:pic>
+      <p:sp>
+        <p:nvSpPr>
+          <p:cNvPr id="8" name="圆角矩形 7"/>
+          <p:cNvSpPr/>
+          <p:nvPr/>
+        </p:nvSpPr>
+        <p:spPr>
+          <a:xfrm>
+            <a:off x="1619672" y="980728"/>
+            <a:ext cx="2376264" cy="360040"/>
+          </a:xfrm>
+          <a:prstGeom prst="roundRect">
+            <a:avLst/>
+          </a:prstGeom>
+          <a:solidFill>
+            <a:srgbClr val="96D5EB"/>
+          </a:solidFill>
+          <a:ln>
+            <a:noFill/>
+          </a:ln>
+        </p:spPr>
+        <p:style>
+          <a:lnRef idx="2">
+            <a:schemeClr val="accent1">
+              <a:shade val="50000"/>
+            </a:schemeClr>
+          </a:lnRef>
+          <a:fillRef idx="1">
+            <a:schemeClr val="accent1"/>
+          </a:fillRef>
+          <a:effectRef idx="0">
+            <a:schemeClr val="accent1"/>
+          </a:effectRef>
+          <a:fontRef idx="minor">
+            <a:schemeClr val="lt1"/>
+          </a:fontRef>
+        </p:style>
+        <p:txBody>
+          <a:bodyPr rtlCol="0" anchor="ctr"/>
+          <a:lstStyle/>
+          <a:p>
+            <a:pPr algn="ctr"/>
+            <a:r>
+              <a:rPr lang="en-US" altLang="zh-CN" dirty="0">
+                <a:solidFill>
+                  <a:srgbClr val="002060"/>
+                </a:solidFill>
+              </a:rPr>
+              <a:t>instanceOopDesc</a:t>
+            </a:r>
+            <a:endParaRPr lang="zh-CN" altLang="en-US" b="1" dirty="0">
+              <a:solidFill>
+                <a:srgbClr val="002060"/>
+              </a:solidFill>
+              <a:latin typeface="Candara" pitchFamily="34" charset="0"/>
+            </a:endParaRPr>
+          </a:p>
+        </p:txBody>
+      </p:sp>
+      <p:sp>
+        <p:nvSpPr>
+          <p:cNvPr id="9" name="圆角矩形 8"/>
+          <p:cNvSpPr/>
+          <p:nvPr/>
+        </p:nvSpPr>
+        <p:spPr>
+          <a:xfrm>
+            <a:off x="395536" y="400547"/>
+            <a:ext cx="1440160" cy="444352"/>
+          </a:xfrm>
+          <a:prstGeom prst="roundRect">
+            <a:avLst/>
+          </a:prstGeom>
+          <a:solidFill>
+            <a:srgbClr val="96D5EB"/>
+          </a:solidFill>
+          <a:ln>
+            <a:noFill/>
+          </a:ln>
+        </p:spPr>
+        <p:style>
+          <a:lnRef idx="2">
+            <a:schemeClr val="accent1">
+              <a:shade val="50000"/>
+            </a:schemeClr>
+          </a:lnRef>
+          <a:fillRef idx="1">
+            <a:schemeClr val="accent1"/>
+          </a:fillRef>
+          <a:effectRef idx="0">
+            <a:schemeClr val="accent1"/>
+          </a:effectRef>
+          <a:fontRef idx="minor">
+            <a:schemeClr val="lt1"/>
+          </a:fontRef>
+        </p:style>
+        <p:txBody>
+          <a:bodyPr rtlCol="0" anchor="ctr"/>
+          <a:lstStyle/>
+          <a:p>
+            <a:pPr algn="ctr"/>
+            <a:r>
+              <a:rPr lang="en-US" altLang="zh-CN" b="1" dirty="0">
+                <a:solidFill>
+                  <a:srgbClr val="002060"/>
+                </a:solidFill>
+                <a:latin typeface="Candara" pitchFamily="34" charset="0"/>
+              </a:rPr>
+              <a:t>oopDesc</a:t>
+            </a:r>
+            <a:endParaRPr lang="zh-CN" altLang="en-US" b="1" dirty="0">
+              <a:solidFill>
+                <a:srgbClr val="002060"/>
+              </a:solidFill>
+              <a:latin typeface="Candara" pitchFamily="34" charset="0"/>
+            </a:endParaRPr>
+          </a:p>
+        </p:txBody>
+      </p:sp>
+      <p:sp>
+        <p:nvSpPr>
+          <p:cNvPr id="18" name="圆角矩形 17"/>
+          <p:cNvSpPr/>
+          <p:nvPr/>
+        </p:nvSpPr>
+        <p:spPr>
+          <a:xfrm>
+            <a:off x="1619672" y="1385032"/>
+            <a:ext cx="2376264" cy="360040"/>
+          </a:xfrm>
+          <a:prstGeom prst="roundRect">
+            <a:avLst/>
+          </a:prstGeom>
+          <a:solidFill>
+            <a:srgbClr val="96D5EB"/>
+          </a:solidFill>
+          <a:ln>
+            <a:noFill/>
+          </a:ln>
+        </p:spPr>
+        <p:style>
+          <a:lnRef idx="2">
+            <a:schemeClr val="accent1">
+              <a:shade val="50000"/>
+            </a:schemeClr>
+          </a:lnRef>
+          <a:fillRef idx="1">
+            <a:schemeClr val="accent1"/>
+          </a:fillRef>
+          <a:effectRef idx="0">
+            <a:schemeClr val="accent1"/>
+          </a:effectRef>
+          <a:fontRef idx="minor">
+            <a:schemeClr val="lt1"/>
+          </a:fontRef>
+        </p:style>
+        <p:txBody>
+          <a:bodyPr rtlCol="0" anchor="ctr"/>
+          <a:lstStyle/>
+          <a:p>
+            <a:pPr algn="ctr"/>
+            <a:r>
+              <a:rPr lang="en-US" altLang="zh-CN" dirty="0">
+                <a:solidFill>
+                  <a:srgbClr val="002060"/>
+                </a:solidFill>
+              </a:rPr>
+              <a:t>methodOopDesc</a:t>
+            </a:r>
+            <a:endParaRPr lang="zh-CN" altLang="en-US" dirty="0">
+              <a:solidFill>
+                <a:srgbClr val="002060"/>
+              </a:solidFill>
+            </a:endParaRPr>
+          </a:p>
+        </p:txBody>
+      </p:sp>
+      <p:sp>
+        <p:nvSpPr>
+          <p:cNvPr id="19" name="圆角矩形 18"/>
+          <p:cNvSpPr/>
+          <p:nvPr/>
+        </p:nvSpPr>
+        <p:spPr>
+          <a:xfrm>
+            <a:off x="1619672" y="1789336"/>
+            <a:ext cx="2376264" cy="360040"/>
+          </a:xfrm>
+          <a:prstGeom prst="roundRect">
+            <a:avLst/>
+          </a:prstGeom>
+          <a:solidFill>
+            <a:srgbClr val="96D5EB"/>
+          </a:solidFill>
+          <a:ln>
+            <a:noFill/>
+          </a:ln>
+        </p:spPr>
+        <p:style>
+          <a:lnRef idx="2">
+            <a:schemeClr val="accent1">
+              <a:shade val="50000"/>
+            </a:schemeClr>
+          </a:lnRef>
+          <a:fillRef idx="1">
+            <a:schemeClr val="accent1"/>
+          </a:fillRef>
+          <a:effectRef idx="0">
+            <a:schemeClr val="accent1"/>
+          </a:effectRef>
+          <a:fontRef idx="minor">
+            <a:schemeClr val="lt1"/>
+          </a:fontRef>
+        </p:style>
+        <p:txBody>
+          <a:bodyPr rtlCol="0" anchor="ctr"/>
+          <a:lstStyle/>
+          <a:p>
+            <a:pPr algn="ctr"/>
+            <a:r>
+              <a:rPr lang="en-US" altLang="zh-CN" dirty="0">
+                <a:solidFill>
+                  <a:srgbClr val="002060"/>
+                </a:solidFill>
+              </a:rPr>
+              <a:t>methodDataOopDesc</a:t>
+            </a:r>
+            <a:endParaRPr lang="zh-CN" altLang="en-US" dirty="0">
+              <a:solidFill>
+                <a:srgbClr val="002060"/>
+              </a:solidFill>
+            </a:endParaRPr>
+          </a:p>
+        </p:txBody>
+      </p:sp>
+      <p:sp>
+        <p:nvSpPr>
+          <p:cNvPr id="21" name="圆角矩形 20"/>
+          <p:cNvSpPr/>
+          <p:nvPr/>
+        </p:nvSpPr>
+        <p:spPr>
+          <a:xfrm>
+            <a:off x="1619672" y="2193640"/>
+            <a:ext cx="2376264" cy="360040"/>
+          </a:xfrm>
+          <a:prstGeom prst="roundRect">
+            <a:avLst/>
+          </a:prstGeom>
+          <a:solidFill>
+            <a:srgbClr val="96D5EB"/>
+          </a:solidFill>
+          <a:ln>
+            <a:noFill/>
+          </a:ln>
+        </p:spPr>
+        <p:style>
+          <a:lnRef idx="2">
+            <a:schemeClr val="accent1">
+              <a:shade val="50000"/>
+            </a:schemeClr>
+          </a:lnRef>
+          <a:fillRef idx="1">
+            <a:schemeClr val="accent1"/>
+          </a:fillRef>
+          <a:effectRef idx="0">
+            <a:schemeClr val="accent1"/>
+          </a:effectRef>
+          <a:fontRef idx="minor">
+            <a:schemeClr val="lt1"/>
+          </a:fontRef>
+        </p:style>
+        <p:txBody>
+          <a:bodyPr rtlCol="0" anchor="ctr"/>
+          <a:lstStyle/>
+          <a:p>
+            <a:pPr algn="ctr"/>
+            <a:r>
+              <a:rPr lang="en-US" altLang="zh-CN" dirty="0">
+                <a:solidFill>
+                  <a:srgbClr val="002060"/>
+                </a:solidFill>
+              </a:rPr>
+              <a:t>arrayOopDesc</a:t>
+            </a:r>
+            <a:endParaRPr lang="zh-CN" altLang="en-US" dirty="0">
+              <a:solidFill>
+                <a:srgbClr val="002060"/>
+              </a:solidFill>
+            </a:endParaRPr>
+          </a:p>
+        </p:txBody>
+      </p:sp>
+      <p:sp>
+        <p:nvSpPr>
+          <p:cNvPr id="22" name="圆角矩形 21"/>
+          <p:cNvSpPr/>
+          <p:nvPr/>
+        </p:nvSpPr>
+        <p:spPr>
+          <a:xfrm>
+            <a:off x="1619672" y="2597944"/>
+            <a:ext cx="2376264" cy="360040"/>
+          </a:xfrm>
+          <a:prstGeom prst="roundRect">
+            <a:avLst/>
+          </a:prstGeom>
+          <a:solidFill>
+            <a:srgbClr val="96D5EB"/>
+          </a:solidFill>
+          <a:ln>
+            <a:noFill/>
+          </a:ln>
+        </p:spPr>
+        <p:style>
+          <a:lnRef idx="2">
+            <a:schemeClr val="accent1">
+              <a:shade val="50000"/>
+            </a:schemeClr>
+          </a:lnRef>
+          <a:fillRef idx="1">
+            <a:schemeClr val="accent1"/>
+          </a:fillRef>
+          <a:effectRef idx="0">
+            <a:schemeClr val="accent1"/>
+          </a:effectRef>
+          <a:fontRef idx="minor">
+            <a:schemeClr val="lt1"/>
+          </a:fontRef>
+        </p:style>
+        <p:txBody>
+          <a:bodyPr rtlCol="0" anchor="ctr"/>
+          <a:lstStyle/>
+          <a:p>
+            <a:pPr algn="ctr"/>
+            <a:r>
+              <a:rPr lang="en-US" altLang="zh-CN" dirty="0">
+                <a:solidFill>
+                  <a:srgbClr val="002060"/>
+                </a:solidFill>
+              </a:rPr>
+              <a:t>objArrayOopDesc</a:t>
+            </a:r>
+            <a:endParaRPr lang="zh-CN" altLang="en-US" dirty="0">
+              <a:solidFill>
+                <a:srgbClr val="002060"/>
+              </a:solidFill>
+            </a:endParaRPr>
+          </a:p>
+        </p:txBody>
+      </p:sp>
+      <p:sp>
+        <p:nvSpPr>
+          <p:cNvPr id="23" name="圆角矩形 22"/>
+          <p:cNvSpPr/>
+          <p:nvPr/>
+        </p:nvSpPr>
+        <p:spPr>
+          <a:xfrm>
+            <a:off x="1619672" y="3002248"/>
+            <a:ext cx="3060340" cy="360040"/>
+          </a:xfrm>
+          <a:prstGeom prst="roundRect">
+            <a:avLst/>
+          </a:prstGeom>
+          <a:solidFill>
+            <a:srgbClr val="96D5EB"/>
+          </a:solidFill>
+          <a:ln>
+            <a:noFill/>
+          </a:ln>
+        </p:spPr>
+        <p:style>
+          <a:lnRef idx="2">
+            <a:schemeClr val="accent1">
+              <a:shade val="50000"/>
+            </a:schemeClr>
+          </a:lnRef>
+          <a:fillRef idx="1">
+            <a:schemeClr val="accent1"/>
+          </a:fillRef>
+          <a:effectRef idx="0">
+            <a:schemeClr val="accent1"/>
+          </a:effectRef>
+          <a:fontRef idx="minor">
+            <a:schemeClr val="lt1"/>
+          </a:fontRef>
+        </p:style>
+        <p:txBody>
+          <a:bodyPr rtlCol="0" anchor="ctr"/>
+          <a:lstStyle/>
+          <a:p>
+            <a:pPr algn="ctr"/>
+            <a:r>
+              <a:rPr lang="en-US" altLang="zh-CN" dirty="0">
+                <a:solidFill>
+                  <a:srgbClr val="002060"/>
+                </a:solidFill>
+              </a:rPr>
+              <a:t>typeArrayOopDesc</a:t>
+            </a:r>
+            <a:endParaRPr lang="zh-CN" altLang="en-US" dirty="0">
+              <a:solidFill>
+                <a:srgbClr val="002060"/>
+              </a:solidFill>
+            </a:endParaRPr>
+          </a:p>
+        </p:txBody>
+      </p:sp>
+      <p:sp>
+        <p:nvSpPr>
+          <p:cNvPr id="24" name="圆角矩形 23"/>
+          <p:cNvSpPr/>
+          <p:nvPr/>
+        </p:nvSpPr>
+        <p:spPr>
+          <a:xfrm>
+            <a:off x="1619672" y="3406552"/>
+            <a:ext cx="3060340" cy="360040"/>
+          </a:xfrm>
+          <a:prstGeom prst="roundRect">
+            <a:avLst/>
+          </a:prstGeom>
+          <a:solidFill>
+            <a:srgbClr val="96D5EB"/>
+          </a:solidFill>
+          <a:ln>
+            <a:noFill/>
+          </a:ln>
+        </p:spPr>
+        <p:style>
+          <a:lnRef idx="2">
+            <a:schemeClr val="accent1">
+              <a:shade val="50000"/>
+            </a:schemeClr>
+          </a:lnRef>
+          <a:fillRef idx="1">
+            <a:schemeClr val="accent1"/>
+          </a:fillRef>
+          <a:effectRef idx="0">
+            <a:schemeClr val="accent1"/>
+          </a:effectRef>
+          <a:fontRef idx="minor">
+            <a:schemeClr val="lt1"/>
+          </a:fontRef>
+        </p:style>
+        <p:txBody>
+          <a:bodyPr rtlCol="0" anchor="ctr"/>
+          <a:lstStyle/>
+          <a:p>
+            <a:pPr algn="ctr"/>
+            <a:r>
+              <a:rPr lang="en-US" altLang="zh-CN" dirty="0">
+                <a:solidFill>
+                  <a:srgbClr val="002060"/>
+                </a:solidFill>
+              </a:rPr>
+              <a:t>constantPoolOopDesc</a:t>
+            </a:r>
+            <a:endParaRPr lang="zh-CN" altLang="en-US" dirty="0">
+              <a:solidFill>
+                <a:srgbClr val="002060"/>
+              </a:solidFill>
+            </a:endParaRPr>
+          </a:p>
+        </p:txBody>
+      </p:sp>
+      <p:sp>
+        <p:nvSpPr>
+          <p:cNvPr id="25" name="圆角矩形 24"/>
+          <p:cNvSpPr/>
+          <p:nvPr/>
+        </p:nvSpPr>
+        <p:spPr>
+          <a:xfrm>
+            <a:off x="1619672" y="3810856"/>
+            <a:ext cx="3060340" cy="360040"/>
+          </a:xfrm>
+          <a:prstGeom prst="roundRect">
+            <a:avLst/>
+          </a:prstGeom>
+          <a:solidFill>
+            <a:srgbClr val="96D5EB"/>
+          </a:solidFill>
+          <a:ln>
+            <a:noFill/>
+          </a:ln>
+        </p:spPr>
+        <p:style>
+          <a:lnRef idx="2">
+            <a:schemeClr val="accent1">
+              <a:shade val="50000"/>
+            </a:schemeClr>
+          </a:lnRef>
+          <a:fillRef idx="1">
+            <a:schemeClr val="accent1"/>
+          </a:fillRef>
+          <a:effectRef idx="0">
+            <a:schemeClr val="accent1"/>
+          </a:effectRef>
+          <a:fontRef idx="minor">
+            <a:schemeClr val="lt1"/>
+          </a:fontRef>
+        </p:style>
+        <p:txBody>
+          <a:bodyPr rtlCol="0" anchor="ctr"/>
+          <a:lstStyle/>
+          <a:p>
+            <a:pPr algn="ctr"/>
+            <a:r>
+              <a:rPr lang="en-US" altLang="zh-CN" dirty="0">
+                <a:solidFill>
+                  <a:srgbClr val="002060"/>
+                </a:solidFill>
+              </a:rPr>
+              <a:t>constantPoolCacheOopDesc</a:t>
+            </a:r>
+            <a:endParaRPr lang="zh-CN" altLang="en-US" dirty="0">
+              <a:solidFill>
+                <a:srgbClr val="002060"/>
+              </a:solidFill>
+            </a:endParaRPr>
+          </a:p>
+        </p:txBody>
+      </p:sp>
+      <p:sp>
+        <p:nvSpPr>
+          <p:cNvPr id="26" name="圆角矩形 25"/>
+          <p:cNvSpPr/>
+          <p:nvPr/>
+        </p:nvSpPr>
+        <p:spPr>
+          <a:xfrm>
+            <a:off x="1619672" y="4215160"/>
+            <a:ext cx="3060340" cy="360040"/>
+          </a:xfrm>
+          <a:prstGeom prst="roundRect">
+            <a:avLst/>
+          </a:prstGeom>
+          <a:solidFill>
+            <a:srgbClr val="96D5EB"/>
+          </a:solidFill>
+          <a:ln>
+            <a:noFill/>
+          </a:ln>
+        </p:spPr>
+        <p:style>
+          <a:lnRef idx="2">
+            <a:schemeClr val="accent1">
+              <a:shade val="50000"/>
+            </a:schemeClr>
+          </a:lnRef>
+          <a:fillRef idx="1">
+            <a:schemeClr val="accent1"/>
+          </a:fillRef>
+          <a:effectRef idx="0">
+            <a:schemeClr val="accent1"/>
+          </a:effectRef>
+          <a:fontRef idx="minor">
+            <a:schemeClr val="lt1"/>
+          </a:fontRef>
+        </p:style>
+        <p:txBody>
+          <a:bodyPr rtlCol="0" anchor="ctr"/>
+          <a:lstStyle/>
+          <a:p>
+            <a:pPr algn="ctr"/>
+            <a:r>
+              <a:rPr lang="en-US" altLang="zh-CN" dirty="0">
+                <a:solidFill>
+                  <a:srgbClr val="002060"/>
+                </a:solidFill>
+              </a:rPr>
+              <a:t>klassOopDesc</a:t>
+            </a:r>
+            <a:endParaRPr lang="zh-CN" altLang="en-US" dirty="0">
+              <a:solidFill>
+                <a:srgbClr val="002060"/>
+              </a:solidFill>
+            </a:endParaRPr>
+          </a:p>
+        </p:txBody>
+      </p:sp>
+      <p:sp>
+        <p:nvSpPr>
+          <p:cNvPr id="27" name="圆角矩形 26"/>
+          <p:cNvSpPr/>
+          <p:nvPr/>
+        </p:nvSpPr>
+        <p:spPr>
+          <a:xfrm>
+            <a:off x="1619672" y="4619464"/>
+            <a:ext cx="3060340" cy="360040"/>
+          </a:xfrm>
+          <a:prstGeom prst="roundRect">
+            <a:avLst/>
+          </a:prstGeom>
+          <a:solidFill>
+            <a:srgbClr val="96D5EB"/>
+          </a:solidFill>
+          <a:ln>
+            <a:noFill/>
+          </a:ln>
+        </p:spPr>
+        <p:style>
+          <a:lnRef idx="2">
+            <a:schemeClr val="accent1">
+              <a:shade val="50000"/>
+            </a:schemeClr>
+          </a:lnRef>
+          <a:fillRef idx="1">
+            <a:schemeClr val="accent1"/>
+          </a:fillRef>
+          <a:effectRef idx="0">
+            <a:schemeClr val="accent1"/>
+          </a:effectRef>
+          <a:fontRef idx="minor">
+            <a:schemeClr val="lt1"/>
+          </a:fontRef>
+        </p:style>
+        <p:txBody>
+          <a:bodyPr rtlCol="0" anchor="ctr"/>
+          <a:lstStyle/>
+          <a:p>
+            <a:pPr algn="ctr"/>
+            <a:r>
+              <a:rPr lang="en-US" altLang="zh-CN" dirty="0">
+                <a:solidFill>
+                  <a:srgbClr val="002060"/>
+                </a:solidFill>
+              </a:rPr>
+              <a:t>markOopDesc</a:t>
+            </a:r>
+            <a:endParaRPr lang="zh-CN" altLang="en-US" dirty="0">
+              <a:solidFill>
+                <a:srgbClr val="002060"/>
+              </a:solidFill>
+            </a:endParaRPr>
+          </a:p>
+        </p:txBody>
+      </p:sp>
+      <p:sp>
+        <p:nvSpPr>
+          <p:cNvPr id="29" name="圆角矩形 28"/>
+          <p:cNvSpPr/>
+          <p:nvPr/>
+        </p:nvSpPr>
+        <p:spPr>
+          <a:xfrm>
+            <a:off x="1619672" y="5023767"/>
+            <a:ext cx="3060340" cy="360040"/>
+          </a:xfrm>
+          <a:prstGeom prst="roundRect">
+            <a:avLst/>
+          </a:prstGeom>
+          <a:solidFill>
+            <a:srgbClr val="96D5EB"/>
+          </a:solidFill>
+          <a:ln>
+            <a:noFill/>
+          </a:ln>
+        </p:spPr>
+        <p:style>
+          <a:lnRef idx="2">
+            <a:schemeClr val="accent1">
+              <a:shade val="50000"/>
+            </a:schemeClr>
+          </a:lnRef>
+          <a:fillRef idx="1">
+            <a:schemeClr val="accent1"/>
+          </a:fillRef>
+          <a:effectRef idx="0">
+            <a:schemeClr val="accent1"/>
+          </a:effectRef>
+          <a:fontRef idx="minor">
+            <a:schemeClr val="lt1"/>
+          </a:fontRef>
+        </p:style>
+        <p:txBody>
+          <a:bodyPr rtlCol="0" anchor="ctr"/>
+          <a:lstStyle/>
+          <a:p>
+            <a:pPr algn="ctr"/>
+            <a:r>
+              <a:rPr lang="en-US" altLang="zh-CN" dirty="0">
+                <a:solidFill>
+                  <a:srgbClr val="002060"/>
+                </a:solidFill>
+              </a:rPr>
+              <a:t>compiledICHolderOopDesc</a:t>
+            </a:r>
+            <a:endParaRPr lang="zh-CN" altLang="en-US" dirty="0">
+              <a:solidFill>
+                <a:srgbClr val="002060"/>
+              </a:solidFill>
+            </a:endParaRPr>
+          </a:p>
+        </p:txBody>
+      </p:sp>
+      <p:cxnSp>
+        <p:nvCxnSpPr>
+          <p:cNvPr id="1038" name="直接箭头连接符 1037"/>
+          <p:cNvCxnSpPr/>
+          <p:nvPr/>
+        </p:nvCxnSpPr>
+        <p:spPr>
+          <a:xfrm flipV="1">
+            <a:off x="1115616" y="822841"/>
+            <a:ext cx="1" cy="4380946"/>
+          </a:xfrm>
+          <a:prstGeom prst="straightConnector1">
+            <a:avLst/>
+          </a:prstGeom>
+          <a:ln w="28575">
+            <a:tailEnd type="triangle"/>
+          </a:ln>
+        </p:spPr>
+        <p:style>
+          <a:lnRef idx="1">
+            <a:schemeClr val="accent1"/>
+          </a:lnRef>
+          <a:fillRef idx="0">
+            <a:schemeClr val="accent1"/>
+          </a:fillRef>
+          <a:effectRef idx="0">
+            <a:schemeClr val="accent1"/>
+          </a:effectRef>
+          <a:fontRef idx="minor">
+            <a:schemeClr val="tx1"/>
+          </a:fontRef>
+        </p:style>
+      </p:cxnSp>
+      <p:cxnSp>
+        <p:nvCxnSpPr>
+          <p:cNvPr id="1042" name="直接连接符 1041"/>
+          <p:cNvCxnSpPr/>
+          <p:nvPr/>
+        </p:nvCxnSpPr>
+        <p:spPr>
+          <a:xfrm flipH="1">
+            <a:off x="1115616" y="1160748"/>
+            <a:ext cx="504056" cy="0"/>
+          </a:xfrm>
+          <a:prstGeom prst="line">
+            <a:avLst/>
+          </a:prstGeom>
+          <a:ln w="28575"/>
+        </p:spPr>
+        <p:style>
+          <a:lnRef idx="1">
+            <a:schemeClr val="accent1"/>
+          </a:lnRef>
+          <a:fillRef idx="0">
+            <a:schemeClr val="accent1"/>
+          </a:fillRef>
+          <a:effectRef idx="0">
+            <a:schemeClr val="accent1"/>
+          </a:effectRef>
+          <a:fontRef idx="minor">
+            <a:schemeClr val="tx1"/>
+          </a:fontRef>
+        </p:style>
+      </p:cxnSp>
+      <p:cxnSp>
+        <p:nvCxnSpPr>
+          <p:cNvPr id="51" name="直接连接符 50"/>
+          <p:cNvCxnSpPr/>
+          <p:nvPr/>
+        </p:nvCxnSpPr>
+        <p:spPr>
+          <a:xfrm flipH="1">
+            <a:off x="1115616" y="1565052"/>
+            <a:ext cx="504056" cy="0"/>
+          </a:xfrm>
+          <a:prstGeom prst="line">
+            <a:avLst/>
+          </a:prstGeom>
+          <a:ln w="28575"/>
+        </p:spPr>
+        <p:style>
+          <a:lnRef idx="1">
+            <a:schemeClr val="accent1"/>
+          </a:lnRef>
+          <a:fillRef idx="0">
+            <a:schemeClr val="accent1"/>
+          </a:fillRef>
+          <a:effectRef idx="0">
+            <a:schemeClr val="accent1"/>
+          </a:effectRef>
+          <a:fontRef idx="minor">
+            <a:schemeClr val="tx1"/>
+          </a:fontRef>
+        </p:style>
+      </p:cxnSp>
+      <p:cxnSp>
+        <p:nvCxnSpPr>
+          <p:cNvPr id="52" name="直接连接符 51"/>
+          <p:cNvCxnSpPr/>
+          <p:nvPr/>
+        </p:nvCxnSpPr>
+        <p:spPr>
+          <a:xfrm flipH="1">
+            <a:off x="1115616" y="1969356"/>
+            <a:ext cx="504056" cy="0"/>
+          </a:xfrm>
+          <a:prstGeom prst="line">
+            <a:avLst/>
+          </a:prstGeom>
+          <a:ln w="28575"/>
+        </p:spPr>
+        <p:style>
+          <a:lnRef idx="1">
+            <a:schemeClr val="accent1"/>
+          </a:lnRef>
+          <a:fillRef idx="0">
+            <a:schemeClr val="accent1"/>
+          </a:fillRef>
+          <a:effectRef idx="0">
+            <a:schemeClr val="accent1"/>
+          </a:effectRef>
+          <a:fontRef idx="minor">
+            <a:schemeClr val="tx1"/>
+          </a:fontRef>
+        </p:style>
+      </p:cxnSp>
+      <p:cxnSp>
+        <p:nvCxnSpPr>
+          <p:cNvPr id="53" name="直接连接符 52"/>
+          <p:cNvCxnSpPr/>
+          <p:nvPr/>
+        </p:nvCxnSpPr>
+        <p:spPr>
+          <a:xfrm flipH="1">
+            <a:off x="1116807" y="2376612"/>
+            <a:ext cx="504056" cy="0"/>
+          </a:xfrm>
+          <a:prstGeom prst="line">
+            <a:avLst/>
+          </a:prstGeom>
+          <a:ln w="28575"/>
+        </p:spPr>
+        <p:style>
+          <a:lnRef idx="1">
+            <a:schemeClr val="accent1"/>
+          </a:lnRef>
+          <a:fillRef idx="0">
+            <a:schemeClr val="accent1"/>
+          </a:fillRef>
+          <a:effectRef idx="0">
+            <a:schemeClr val="accent1"/>
+          </a:effectRef>
+          <a:fontRef idx="minor">
+            <a:schemeClr val="tx1"/>
+          </a:fontRef>
+        </p:style>
+      </p:cxnSp>
+      <p:cxnSp>
+        <p:nvCxnSpPr>
+          <p:cNvPr id="54" name="直接连接符 53"/>
+          <p:cNvCxnSpPr/>
+          <p:nvPr/>
+        </p:nvCxnSpPr>
+        <p:spPr>
+          <a:xfrm flipH="1">
+            <a:off x="1116807" y="2777964"/>
+            <a:ext cx="504056" cy="0"/>
+          </a:xfrm>
+          <a:prstGeom prst="line">
+            <a:avLst/>
+          </a:prstGeom>
+          <a:ln w="28575"/>
+        </p:spPr>
+        <p:style>
+          <a:lnRef idx="1">
+            <a:schemeClr val="accent1"/>
+          </a:lnRef>
+          <a:fillRef idx="0">
+            <a:schemeClr val="accent1"/>
+          </a:fillRef>
+          <a:effectRef idx="0">
+            <a:schemeClr val="accent1"/>
+          </a:effectRef>
+          <a:fontRef idx="minor">
+            <a:schemeClr val="tx1"/>
+          </a:fontRef>
+        </p:style>
+      </p:cxnSp>
+      <p:cxnSp>
+        <p:nvCxnSpPr>
+          <p:cNvPr id="55" name="直接连接符 54"/>
+          <p:cNvCxnSpPr/>
+          <p:nvPr/>
+        </p:nvCxnSpPr>
+        <p:spPr>
+          <a:xfrm flipH="1">
+            <a:off x="1115616" y="3182268"/>
+            <a:ext cx="504056" cy="0"/>
+          </a:xfrm>
+          <a:prstGeom prst="line">
+            <a:avLst/>
+          </a:prstGeom>
+          <a:ln w="28575"/>
+        </p:spPr>
+        <p:style>
+          <a:lnRef idx="1">
+            <a:schemeClr val="accent1"/>
+          </a:lnRef>
+          <a:fillRef idx="0">
+            <a:schemeClr val="accent1"/>
+          </a:fillRef>
+          <a:effectRef idx="0">
+            <a:schemeClr val="accent1"/>
+          </a:effectRef>
+          <a:fontRef idx="minor">
+            <a:schemeClr val="tx1"/>
+          </a:fontRef>
+        </p:style>
+      </p:cxnSp>
+      <p:cxnSp>
+        <p:nvCxnSpPr>
+          <p:cNvPr id="56" name="直接连接符 55"/>
+          <p:cNvCxnSpPr/>
+          <p:nvPr/>
+        </p:nvCxnSpPr>
+        <p:spPr>
+          <a:xfrm flipH="1">
+            <a:off x="1116807" y="3586572"/>
+            <a:ext cx="504056" cy="0"/>
+          </a:xfrm>
+          <a:prstGeom prst="line">
+            <a:avLst/>
+          </a:prstGeom>
+          <a:ln w="28575"/>
+        </p:spPr>
+        <p:style>
+          <a:lnRef idx="1">
+            <a:schemeClr val="accent1"/>
+          </a:lnRef>
+          <a:fillRef idx="0">
+            <a:schemeClr val="accent1"/>
+          </a:fillRef>
+          <a:effectRef idx="0">
+            <a:schemeClr val="accent1"/>
+          </a:effectRef>
+          <a:fontRef idx="minor">
+            <a:schemeClr val="tx1"/>
+          </a:fontRef>
+        </p:style>
+      </p:cxnSp>
+      <p:cxnSp>
+        <p:nvCxnSpPr>
+          <p:cNvPr id="57" name="直接连接符 56"/>
+          <p:cNvCxnSpPr/>
+          <p:nvPr/>
+        </p:nvCxnSpPr>
+        <p:spPr>
+          <a:xfrm flipH="1">
+            <a:off x="1115616" y="3990876"/>
+            <a:ext cx="504056" cy="0"/>
+          </a:xfrm>
+          <a:prstGeom prst="line">
+            <a:avLst/>
+          </a:prstGeom>
+          <a:ln w="28575"/>
+        </p:spPr>
+        <p:style>
+          <a:lnRef idx="1">
+            <a:schemeClr val="accent1"/>
+          </a:lnRef>
+          <a:fillRef idx="0">
+            <a:schemeClr val="accent1"/>
+          </a:fillRef>
+          <a:effectRef idx="0">
+            <a:schemeClr val="accent1"/>
+          </a:effectRef>
+          <a:fontRef idx="minor">
+            <a:schemeClr val="tx1"/>
+          </a:fontRef>
+        </p:style>
+      </p:cxnSp>
+      <p:cxnSp>
+        <p:nvCxnSpPr>
+          <p:cNvPr id="58" name="直接连接符 57"/>
+          <p:cNvCxnSpPr/>
+          <p:nvPr/>
+        </p:nvCxnSpPr>
+        <p:spPr>
+          <a:xfrm flipH="1">
+            <a:off x="1115616" y="4395180"/>
+            <a:ext cx="504056" cy="0"/>
+          </a:xfrm>
+          <a:prstGeom prst="line">
+            <a:avLst/>
+          </a:prstGeom>
+          <a:ln w="28575"/>
+        </p:spPr>
+        <p:style>
+          <a:lnRef idx="1">
+            <a:schemeClr val="accent1"/>
+          </a:lnRef>
+          <a:fillRef idx="0">
+            <a:schemeClr val="accent1"/>
+          </a:fillRef>
+          <a:effectRef idx="0">
+            <a:schemeClr val="accent1"/>
+          </a:effectRef>
+          <a:fontRef idx="minor">
+            <a:schemeClr val="tx1"/>
+          </a:fontRef>
+        </p:style>
+      </p:cxnSp>
+      <p:cxnSp>
+        <p:nvCxnSpPr>
+          <p:cNvPr id="59" name="直接连接符 58"/>
+          <p:cNvCxnSpPr/>
+          <p:nvPr/>
+        </p:nvCxnSpPr>
+        <p:spPr>
+          <a:xfrm flipH="1">
+            <a:off x="1116807" y="4799484"/>
+            <a:ext cx="504056" cy="0"/>
+          </a:xfrm>
+          <a:prstGeom prst="line">
+            <a:avLst/>
+          </a:prstGeom>
+          <a:ln w="28575"/>
+        </p:spPr>
+        <p:style>
+          <a:lnRef idx="1">
+            <a:schemeClr val="accent1"/>
+          </a:lnRef>
+          <a:fillRef idx="0">
+            <a:schemeClr val="accent1"/>
+          </a:fillRef>
+          <a:effectRef idx="0">
+            <a:schemeClr val="accent1"/>
+          </a:effectRef>
+          <a:fontRef idx="minor">
+            <a:schemeClr val="tx1"/>
+          </a:fontRef>
+        </p:style>
+      </p:cxnSp>
+      <p:cxnSp>
+        <p:nvCxnSpPr>
+          <p:cNvPr id="60" name="直接连接符 59"/>
+          <p:cNvCxnSpPr/>
+          <p:nvPr/>
+        </p:nvCxnSpPr>
+        <p:spPr>
+          <a:xfrm flipH="1">
+            <a:off x="1115616" y="5203787"/>
+            <a:ext cx="504056" cy="0"/>
+          </a:xfrm>
+          <a:prstGeom prst="line">
+            <a:avLst/>
+          </a:prstGeom>
+          <a:ln w="28575"/>
+        </p:spPr>
+        <p:style>
+          <a:lnRef idx="1">
+            <a:schemeClr val="accent1"/>
+          </a:lnRef>
+          <a:fillRef idx="0">
+            <a:schemeClr val="accent1"/>
+          </a:fillRef>
+          <a:effectRef idx="0">
+            <a:schemeClr val="accent1"/>
+          </a:effectRef>
+          <a:fontRef idx="minor">
+            <a:schemeClr val="tx1"/>
+          </a:fontRef>
+        </p:style>
+      </p:cxnSp>
+    </p:spTree>
+    <p:extLst>
+      <p:ext uri="{BB962C8B-B14F-4D97-AF65-F5344CB8AC3E}">
+        <p14:creationId xmlns:p14="http://schemas.microsoft.com/office/powerpoint/2010/main" val="1393920390"/>
+      </p:ext>
+    </p:extLst>
+  </p:cSld>
+  <p:clrMapOvr>
+    <a:masterClrMapping/>
+  </p:clrMapOvr>
+  <p:timing>
+    <p:tnLst>
+      <p:par>
+        <p:cTn id="1" dur="indefinite" restart="never" nodeType="tmRoot"/>
+      </p:par>
+    </p:tnLst>
+  </p:timing>
 </p:sld>
 </file>
 

</xml_diff>

<commit_message>
Site updated: 2016-10-10 09:03:42
</commit_message>
<xml_diff>
--- a/ppt/Klass.pptx
+++ b/ppt/Klass.pptx
@@ -7888,42 +7888,533 @@
       </p:grpSp>
       <p:grpSp>
         <p:nvGrpSpPr>
-          <p:cNvPr id="91" name="组合 90"/>
+          <p:cNvPr id="131" name="组合 130"/>
           <p:cNvGrpSpPr/>
           <p:nvPr/>
         </p:nvGrpSpPr>
         <p:grpSpPr>
           <a:xfrm>
-            <a:off x="3997147" y="2365634"/>
-            <a:ext cx="1584176" cy="1193840"/>
-            <a:chOff x="3421360" y="332658"/>
-            <a:chExt cx="2837682" cy="1193840"/>
+            <a:off x="2692477" y="2365634"/>
+            <a:ext cx="2888846" cy="1193840"/>
+            <a:chOff x="2692477" y="2365634"/>
+            <a:chExt cx="2888846" cy="1193840"/>
           </a:xfrm>
         </p:grpSpPr>
         <p:grpSp>
           <p:nvGrpSpPr>
-            <p:cNvPr id="92" name="组合 91"/>
+            <p:cNvPr id="91" name="组合 90"/>
+            <p:cNvGrpSpPr/>
+            <p:nvPr/>
+          </p:nvGrpSpPr>
+          <p:grpSpPr>
+            <a:xfrm>
+              <a:off x="3997147" y="2365634"/>
+              <a:ext cx="1584176" cy="1193840"/>
+              <a:chOff x="3421360" y="332658"/>
+              <a:chExt cx="2837682" cy="1193840"/>
+            </a:xfrm>
+          </p:grpSpPr>
+          <p:grpSp>
+            <p:nvGrpSpPr>
+              <p:cNvPr id="92" name="组合 91"/>
+              <p:cNvGrpSpPr/>
+              <p:nvPr/>
+            </p:nvGrpSpPr>
+            <p:grpSpPr>
+              <a:xfrm>
+                <a:off x="3421360" y="332658"/>
+                <a:ext cx="2837682" cy="1193840"/>
+                <a:chOff x="0" y="17426"/>
+                <a:chExt cx="1150168" cy="1193840"/>
+              </a:xfrm>
+            </p:grpSpPr>
+            <p:sp>
+              <p:nvSpPr>
+                <p:cNvPr id="96" name="圆角矩形 95"/>
+                <p:cNvSpPr/>
+                <p:nvPr/>
+              </p:nvSpPr>
+              <p:spPr>
+                <a:xfrm>
+                  <a:off x="0" y="17426"/>
+                  <a:ext cx="1150168" cy="1193840"/>
+                </a:xfrm>
+                <a:prstGeom prst="roundRect">
+                  <a:avLst>
+                    <a:gd name="adj" fmla="val 3952"/>
+                  </a:avLst>
+                </a:prstGeom>
+                <a:solidFill>
+                  <a:schemeClr val="bg1"/>
+                </a:solidFill>
+                <a:ln>
+                  <a:solidFill>
+                    <a:srgbClr val="00B0F0"/>
+                  </a:solidFill>
+                </a:ln>
+              </p:spPr>
+              <p:style>
+                <a:lnRef idx="2">
+                  <a:schemeClr val="accent1">
+                    <a:shade val="50000"/>
+                  </a:schemeClr>
+                </a:lnRef>
+                <a:fillRef idx="1">
+                  <a:schemeClr val="accent1"/>
+                </a:fillRef>
+                <a:effectRef idx="0">
+                  <a:schemeClr val="accent1"/>
+                </a:effectRef>
+                <a:fontRef idx="minor">
+                  <a:schemeClr val="lt1"/>
+                </a:fontRef>
+              </p:style>
+              <p:txBody>
+                <a:bodyPr rtlCol="0" anchor="ctr"/>
+                <a:lstStyle/>
+                <a:p>
+                  <a:pPr algn="ctr"/>
+                  <a:endParaRPr lang="zh-CN" altLang="en-US" dirty="0"/>
+                </a:p>
+              </p:txBody>
+            </p:sp>
+            <p:cxnSp>
+              <p:nvCxnSpPr>
+                <p:cNvPr id="97" name="直接连接符 96"/>
+                <p:cNvCxnSpPr/>
+                <p:nvPr/>
+              </p:nvCxnSpPr>
+              <p:spPr>
+                <a:xfrm>
+                  <a:off x="0" y="311727"/>
+                  <a:ext cx="1150168" cy="0"/>
+                </a:xfrm>
+                <a:prstGeom prst="line">
+                  <a:avLst/>
+                </a:prstGeom>
+                <a:ln w="25400">
+                  <a:solidFill>
+                    <a:srgbClr val="00B0F0"/>
+                  </a:solidFill>
+                </a:ln>
+              </p:spPr>
+              <p:style>
+                <a:lnRef idx="1">
+                  <a:schemeClr val="accent1"/>
+                </a:lnRef>
+                <a:fillRef idx="0">
+                  <a:schemeClr val="accent1"/>
+                </a:fillRef>
+                <a:effectRef idx="0">
+                  <a:schemeClr val="accent1"/>
+                </a:effectRef>
+                <a:fontRef idx="minor">
+                  <a:schemeClr val="tx1"/>
+                </a:fontRef>
+              </p:style>
+            </p:cxnSp>
+            <p:cxnSp>
+              <p:nvCxnSpPr>
+                <p:cNvPr id="98" name="直接连接符 97"/>
+                <p:cNvCxnSpPr/>
+                <p:nvPr/>
+              </p:nvCxnSpPr>
+              <p:spPr>
+                <a:xfrm>
+                  <a:off x="0" y="935181"/>
+                  <a:ext cx="1150168" cy="0"/>
+                </a:xfrm>
+                <a:prstGeom prst="line">
+                  <a:avLst/>
+                </a:prstGeom>
+                <a:ln w="25400">
+                  <a:solidFill>
+                    <a:srgbClr val="00B0F0"/>
+                  </a:solidFill>
+                </a:ln>
+              </p:spPr>
+              <p:style>
+                <a:lnRef idx="1">
+                  <a:schemeClr val="accent1"/>
+                </a:lnRef>
+                <a:fillRef idx="0">
+                  <a:schemeClr val="accent1"/>
+                </a:fillRef>
+                <a:effectRef idx="0">
+                  <a:schemeClr val="accent1"/>
+                </a:effectRef>
+                <a:fontRef idx="minor">
+                  <a:schemeClr val="tx1"/>
+                </a:fontRef>
+              </p:style>
+            </p:cxnSp>
+            <p:cxnSp>
+              <p:nvCxnSpPr>
+                <p:cNvPr id="99" name="直接连接符 98"/>
+                <p:cNvCxnSpPr/>
+                <p:nvPr/>
+              </p:nvCxnSpPr>
+              <p:spPr>
+                <a:xfrm>
+                  <a:off x="0" y="623454"/>
+                  <a:ext cx="1150168" cy="0"/>
+                </a:xfrm>
+                <a:prstGeom prst="line">
+                  <a:avLst/>
+                </a:prstGeom>
+                <a:ln w="25400">
+                  <a:solidFill>
+                    <a:srgbClr val="00B0F0"/>
+                  </a:solidFill>
+                </a:ln>
+              </p:spPr>
+              <p:style>
+                <a:lnRef idx="1">
+                  <a:schemeClr val="accent1"/>
+                </a:lnRef>
+                <a:fillRef idx="0">
+                  <a:schemeClr val="accent1"/>
+                </a:fillRef>
+                <a:effectRef idx="0">
+                  <a:schemeClr val="accent1"/>
+                </a:effectRef>
+                <a:fontRef idx="minor">
+                  <a:schemeClr val="tx1"/>
+                </a:fontRef>
+              </p:style>
+            </p:cxnSp>
+          </p:grpSp>
+          <p:sp>
+            <p:nvSpPr>
+              <p:cNvPr id="93" name="TextBox 92"/>
+              <p:cNvSpPr txBox="1"/>
+              <p:nvPr/>
+            </p:nvSpPr>
+            <p:spPr>
+              <a:xfrm>
+                <a:off x="3697688" y="342260"/>
+                <a:ext cx="2134029" cy="307777"/>
+              </a:xfrm>
+              <a:prstGeom prst="rect">
+                <a:avLst/>
+              </a:prstGeom>
+              <a:noFill/>
+            </p:spPr>
+            <p:txBody>
+              <a:bodyPr wrap="none" rtlCol="0">
+                <a:spAutoFit/>
+              </a:bodyPr>
+              <a:lstStyle/>
+              <a:p>
+                <a:r>
+                  <a:rPr lang="en-US" altLang="zh-CN" sz="1400" b="1" i="1" dirty="0">
+                    <a:solidFill>
+                      <a:srgbClr val="002060"/>
+                    </a:solidFill>
+                  </a:rPr>
+                  <a:t>klassKlassObj</a:t>
+                </a:r>
+                <a:endParaRPr lang="zh-CN" altLang="en-US" sz="1400" b="1" i="1" dirty="0">
+                  <a:solidFill>
+                    <a:srgbClr val="002060"/>
+                  </a:solidFill>
+                </a:endParaRPr>
+              </a:p>
+            </p:txBody>
+          </p:sp>
+          <p:sp>
+            <p:nvSpPr>
+              <p:cNvPr id="94" name="TextBox 93"/>
+              <p:cNvSpPr txBox="1"/>
+              <p:nvPr/>
+            </p:nvSpPr>
+            <p:spPr>
+              <a:xfrm>
+                <a:off x="3421360" y="633780"/>
+                <a:ext cx="1907189" cy="276999"/>
+              </a:xfrm>
+              <a:prstGeom prst="rect">
+                <a:avLst/>
+              </a:prstGeom>
+              <a:noFill/>
+            </p:spPr>
+            <p:txBody>
+              <a:bodyPr wrap="none" rtlCol="0">
+                <a:spAutoFit/>
+              </a:bodyPr>
+              <a:lstStyle/>
+              <a:p>
+                <a:r>
+                  <a:rPr lang="en-US" altLang="zh-CN" sz="1200" b="1" dirty="0" smtClean="0">
+                    <a:solidFill>
+                      <a:srgbClr val="002060"/>
+                    </a:solidFill>
+                  </a:rPr>
+                  <a:t>klassOopDesc</a:t>
+                </a:r>
+                <a:endParaRPr lang="zh-CN" altLang="en-US" sz="1200" b="1" dirty="0">
+                  <a:solidFill>
+                    <a:srgbClr val="002060"/>
+                  </a:solidFill>
+                </a:endParaRPr>
+              </a:p>
+            </p:txBody>
+          </p:sp>
+          <p:sp>
+            <p:nvSpPr>
+              <p:cNvPr id="95" name="TextBox 94"/>
+              <p:cNvSpPr txBox="1"/>
+              <p:nvPr/>
+            </p:nvSpPr>
+            <p:spPr>
+              <a:xfrm>
+                <a:off x="3421360" y="948432"/>
+                <a:ext cx="1459250" cy="276999"/>
+              </a:xfrm>
+              <a:prstGeom prst="rect">
+                <a:avLst/>
+              </a:prstGeom>
+              <a:noFill/>
+            </p:spPr>
+            <p:txBody>
+              <a:bodyPr wrap="none" rtlCol="0">
+                <a:spAutoFit/>
+              </a:bodyPr>
+              <a:lstStyle>
+                <a:defPPr>
+                  <a:defRPr lang="zh-CN"/>
+                </a:defPPr>
+                <a:lvl1pPr>
+                  <a:defRPr sz="1200" b="1">
+                    <a:solidFill>
+                      <a:srgbClr val="002060"/>
+                    </a:solidFill>
+                  </a:defRPr>
+                </a:lvl1pPr>
+              </a:lstStyle>
+              <a:p>
+                <a:r>
+                  <a:rPr lang="en-US" altLang="zh-CN" dirty="0"/>
+                  <a:t>klassKlass</a:t>
+                </a:r>
+                <a:endParaRPr lang="zh-CN" altLang="en-US" dirty="0"/>
+              </a:p>
+            </p:txBody>
+          </p:sp>
+        </p:grpSp>
+        <p:grpSp>
+          <p:nvGrpSpPr>
+            <p:cNvPr id="111" name="组合 110"/>
+            <p:cNvGrpSpPr/>
+            <p:nvPr/>
+          </p:nvGrpSpPr>
+          <p:grpSpPr>
+            <a:xfrm>
+              <a:off x="3668451" y="2368255"/>
+              <a:ext cx="328696" cy="620108"/>
+              <a:chOff x="4211821" y="518856"/>
+              <a:chExt cx="328696" cy="620108"/>
+            </a:xfrm>
+          </p:grpSpPr>
+          <p:cxnSp>
+            <p:nvCxnSpPr>
+              <p:cNvPr id="104" name="直接连接符 103"/>
+              <p:cNvCxnSpPr/>
+              <p:nvPr/>
+            </p:nvCxnSpPr>
+            <p:spPr>
+              <a:xfrm>
+                <a:off x="4211821" y="518856"/>
+                <a:ext cx="0" cy="620108"/>
+              </a:xfrm>
+              <a:prstGeom prst="line">
+                <a:avLst/>
+              </a:prstGeom>
+              <a:solidFill>
+                <a:schemeClr val="bg1"/>
+              </a:solidFill>
+              <a:ln>
+                <a:solidFill>
+                  <a:srgbClr val="00B0F0"/>
+                </a:solidFill>
+              </a:ln>
+            </p:spPr>
+            <p:style>
+              <a:lnRef idx="2">
+                <a:schemeClr val="accent1">
+                  <a:shade val="50000"/>
+                </a:schemeClr>
+              </a:lnRef>
+              <a:fillRef idx="1">
+                <a:schemeClr val="accent1"/>
+              </a:fillRef>
+              <a:effectRef idx="0">
+                <a:schemeClr val="accent1"/>
+              </a:effectRef>
+              <a:fontRef idx="minor">
+                <a:schemeClr val="lt1"/>
+              </a:fontRef>
+            </p:style>
+          </p:cxnSp>
+          <p:cxnSp>
+            <p:nvCxnSpPr>
+              <p:cNvPr id="108" name="直接箭头连接符 107"/>
+              <p:cNvCxnSpPr/>
+              <p:nvPr/>
+            </p:nvCxnSpPr>
+            <p:spPr>
+              <a:xfrm>
+                <a:off x="4211821" y="518856"/>
+                <a:ext cx="328696" cy="0"/>
+              </a:xfrm>
+              <a:prstGeom prst="straightConnector1">
+                <a:avLst/>
+              </a:prstGeom>
+              <a:solidFill>
+                <a:schemeClr val="bg1"/>
+              </a:solidFill>
+              <a:ln>
+                <a:solidFill>
+                  <a:srgbClr val="00B0F0"/>
+                </a:solidFill>
+                <a:tailEnd type="triangle"/>
+              </a:ln>
+            </p:spPr>
+            <p:style>
+              <a:lnRef idx="2">
+                <a:schemeClr val="accent1">
+                  <a:shade val="50000"/>
+                </a:schemeClr>
+              </a:lnRef>
+              <a:fillRef idx="1">
+                <a:schemeClr val="accent1"/>
+              </a:fillRef>
+              <a:effectRef idx="0">
+                <a:schemeClr val="accent1"/>
+              </a:effectRef>
+              <a:fontRef idx="minor">
+                <a:schemeClr val="lt1"/>
+              </a:fontRef>
+            </p:style>
+          </p:cxnSp>
+          <p:cxnSp>
+            <p:nvCxnSpPr>
+              <p:cNvPr id="110" name="直接连接符 109"/>
+              <p:cNvCxnSpPr/>
+              <p:nvPr/>
+            </p:nvCxnSpPr>
+            <p:spPr>
+              <a:xfrm>
+                <a:off x="4211821" y="1129204"/>
+                <a:ext cx="328696" cy="0"/>
+              </a:xfrm>
+              <a:prstGeom prst="line">
+                <a:avLst/>
+              </a:prstGeom>
+              <a:solidFill>
+                <a:schemeClr val="bg1"/>
+              </a:solidFill>
+              <a:ln>
+                <a:solidFill>
+                  <a:srgbClr val="00B0F0"/>
+                </a:solidFill>
+              </a:ln>
+            </p:spPr>
+            <p:style>
+              <a:lnRef idx="2">
+                <a:schemeClr val="accent1">
+                  <a:shade val="50000"/>
+                </a:schemeClr>
+              </a:lnRef>
+              <a:fillRef idx="1">
+                <a:schemeClr val="accent1"/>
+              </a:fillRef>
+              <a:effectRef idx="0">
+                <a:schemeClr val="accent1"/>
+              </a:effectRef>
+              <a:fontRef idx="minor">
+                <a:schemeClr val="lt1"/>
+              </a:fontRef>
+            </p:style>
+          </p:cxnSp>
+        </p:grpSp>
+        <p:sp>
+          <p:nvSpPr>
+            <p:cNvPr id="121" name="TextBox 120"/>
+            <p:cNvSpPr txBox="1"/>
+            <p:nvPr/>
+          </p:nvSpPr>
+          <p:spPr>
+            <a:xfrm>
+              <a:off x="2692477" y="2697536"/>
+              <a:ext cx="989438" cy="307777"/>
+            </a:xfrm>
+            <a:prstGeom prst="rect">
+              <a:avLst/>
+            </a:prstGeom>
+            <a:noFill/>
+          </p:spPr>
+          <p:txBody>
+            <a:bodyPr wrap="none" rtlCol="0">
+              <a:spAutoFit/>
+            </a:bodyPr>
+            <a:lstStyle/>
+            <a:p>
+              <a:r>
+                <a:rPr lang="en-US" altLang="zh-CN" sz="1400" b="1" dirty="0" smtClean="0">
+                  <a:solidFill>
+                    <a:srgbClr val="0070C0"/>
+                  </a:solidFill>
+                </a:rPr>
+                <a:t>_metadata</a:t>
+              </a:r>
+              <a:endParaRPr lang="zh-CN" altLang="en-US" sz="1400" b="1" dirty="0">
+                <a:solidFill>
+                  <a:srgbClr val="0070C0"/>
+                </a:solidFill>
+              </a:endParaRPr>
+            </a:p>
+          </p:txBody>
+        </p:sp>
+      </p:grpSp>
+      <p:grpSp>
+        <p:nvGrpSpPr>
+          <p:cNvPr id="122" name="组合 121"/>
+          <p:cNvGrpSpPr/>
+          <p:nvPr/>
+        </p:nvGrpSpPr>
+        <p:grpSpPr>
+          <a:xfrm>
+            <a:off x="390560" y="3119907"/>
+            <a:ext cx="1584177" cy="885157"/>
+            <a:chOff x="3421360" y="332657"/>
+            <a:chExt cx="2837682" cy="885157"/>
+          </a:xfrm>
+        </p:grpSpPr>
+        <p:grpSp>
+          <p:nvGrpSpPr>
+            <p:cNvPr id="123" name="组合 122"/>
             <p:cNvGrpSpPr/>
             <p:nvPr/>
           </p:nvGrpSpPr>
           <p:grpSpPr>
             <a:xfrm>
               <a:off x="3421360" y="332658"/>
-              <a:ext cx="2837682" cy="1193840"/>
+              <a:ext cx="2837682" cy="885156"/>
               <a:chOff x="0" y="17426"/>
-              <a:chExt cx="1150168" cy="1193840"/>
+              <a:chExt cx="1150168" cy="885156"/>
             </a:xfrm>
           </p:grpSpPr>
           <p:sp>
             <p:nvSpPr>
-              <p:cNvPr id="96" name="圆角矩形 95"/>
+              <p:cNvPr id="127" name="圆角矩形 126"/>
               <p:cNvSpPr/>
               <p:nvPr/>
             </p:nvSpPr>
             <p:spPr>
               <a:xfrm>
                 <a:off x="0" y="17426"/>
-                <a:ext cx="1150168" cy="1193840"/>
+                <a:ext cx="1150168" cy="885156"/>
               </a:xfrm>
               <a:prstGeom prst="roundRect">
                 <a:avLst>
@@ -7966,7 +8457,7 @@
           </p:sp>
           <p:cxnSp>
             <p:nvCxnSpPr>
-              <p:cNvPr id="97" name="直接连接符 96"/>
+              <p:cNvPr id="128" name="直接连接符 127"/>
               <p:cNvCxnSpPr/>
               <p:nvPr/>
             </p:nvCxnSpPr>
@@ -8001,42 +8492,7 @@
           </p:cxnSp>
           <p:cxnSp>
             <p:nvCxnSpPr>
-              <p:cNvPr id="98" name="直接连接符 97"/>
-              <p:cNvCxnSpPr/>
-              <p:nvPr/>
-            </p:nvCxnSpPr>
-            <p:spPr>
-              <a:xfrm>
-                <a:off x="0" y="935181"/>
-                <a:ext cx="1150168" cy="0"/>
-              </a:xfrm>
-              <a:prstGeom prst="line">
-                <a:avLst/>
-              </a:prstGeom>
-              <a:ln w="25400">
-                <a:solidFill>
-                  <a:srgbClr val="00B0F0"/>
-                </a:solidFill>
-              </a:ln>
-            </p:spPr>
-            <p:style>
-              <a:lnRef idx="1">
-                <a:schemeClr val="accent1"/>
-              </a:lnRef>
-              <a:fillRef idx="0">
-                <a:schemeClr val="accent1"/>
-              </a:fillRef>
-              <a:effectRef idx="0">
-                <a:schemeClr val="accent1"/>
-              </a:effectRef>
-              <a:fontRef idx="minor">
-                <a:schemeClr val="tx1"/>
-              </a:fontRef>
-            </p:style>
-          </p:cxnSp>
-          <p:cxnSp>
-            <p:nvCxnSpPr>
-              <p:cNvPr id="99" name="直接连接符 98"/>
+              <p:cNvPr id="130" name="直接连接符 129"/>
               <p:cNvCxnSpPr/>
               <p:nvPr/>
             </p:nvCxnSpPr>
@@ -8072,14 +8528,14 @@
         </p:grpSp>
         <p:sp>
           <p:nvSpPr>
-            <p:cNvPr id="93" name="TextBox 92"/>
+            <p:cNvPr id="124" name="TextBox 123"/>
             <p:cNvSpPr txBox="1"/>
             <p:nvPr/>
           </p:nvSpPr>
           <p:spPr>
             <a:xfrm>
-              <a:off x="3697688" y="342260"/>
-              <a:ext cx="2134029" cy="307777"/>
+              <a:off x="3522396" y="332657"/>
+              <a:ext cx="2635606" cy="307777"/>
             </a:xfrm>
             <a:prstGeom prst="rect">
               <a:avLst/>
@@ -8093,14 +8549,14 @@
             <a:lstStyle/>
             <a:p>
               <a:r>
-                <a:rPr lang="en-US" altLang="zh-CN" sz="1400" b="1" i="1" dirty="0">
+                <a:rPr lang="en-US" altLang="zh-CN" sz="1400" b="1" dirty="0">
                   <a:solidFill>
                     <a:srgbClr val="002060"/>
                   </a:solidFill>
                 </a:rPr>
-                <a:t>klassKlassObj</a:t>
+                <a:t>instanceOopDesc</a:t>
               </a:r>
-              <a:endParaRPr lang="zh-CN" altLang="en-US" sz="1400" b="1" i="1" dirty="0">
+              <a:endParaRPr lang="zh-CN" altLang="en-US" sz="1400" b="1" dirty="0">
                 <a:solidFill>
                   <a:srgbClr val="002060"/>
                 </a:solidFill>
@@ -8110,14 +8566,14 @@
         </p:sp>
         <p:sp>
           <p:nvSpPr>
-            <p:cNvPr id="94" name="TextBox 93"/>
+            <p:cNvPr id="125" name="TextBox 124"/>
             <p:cNvSpPr txBox="1"/>
             <p:nvPr/>
           </p:nvSpPr>
           <p:spPr>
             <a:xfrm>
               <a:off x="3421360" y="633780"/>
-              <a:ext cx="1907189" cy="276999"/>
+              <a:ext cx="1315678" cy="276999"/>
             </a:xfrm>
             <a:prstGeom prst="rect">
               <a:avLst/>
@@ -8136,7 +8592,7 @@
                     <a:srgbClr val="002060"/>
                   </a:solidFill>
                 </a:rPr>
-                <a:t>klassOopDesc</a:t>
+                <a:t>oopDesc</a:t>
               </a:r>
               <a:endParaRPr lang="zh-CN" altLang="en-US" sz="1200" b="1" dirty="0">
                 <a:solidFill>
@@ -8146,222 +8602,7 @@
             </a:p>
           </p:txBody>
         </p:sp>
-        <p:sp>
-          <p:nvSpPr>
-            <p:cNvPr id="95" name="TextBox 94"/>
-            <p:cNvSpPr txBox="1"/>
-            <p:nvPr/>
-          </p:nvSpPr>
-          <p:spPr>
-            <a:xfrm>
-              <a:off x="3421360" y="948432"/>
-              <a:ext cx="1459250" cy="276999"/>
-            </a:xfrm>
-            <a:prstGeom prst="rect">
-              <a:avLst/>
-            </a:prstGeom>
-            <a:noFill/>
-          </p:spPr>
-          <p:txBody>
-            <a:bodyPr wrap="none" rtlCol="0">
-              <a:spAutoFit/>
-            </a:bodyPr>
-            <a:lstStyle>
-              <a:defPPr>
-                <a:defRPr lang="zh-CN"/>
-              </a:defPPr>
-              <a:lvl1pPr>
-                <a:defRPr sz="1200" b="1">
-                  <a:solidFill>
-                    <a:srgbClr val="002060"/>
-                  </a:solidFill>
-                </a:defRPr>
-              </a:lvl1pPr>
-            </a:lstStyle>
-            <a:p>
-              <a:r>
-                <a:rPr lang="en-US" altLang="zh-CN" dirty="0"/>
-                <a:t>klassKlass</a:t>
-              </a:r>
-              <a:endParaRPr lang="zh-CN" altLang="en-US" dirty="0"/>
-            </a:p>
-          </p:txBody>
-        </p:sp>
       </p:grpSp>
-      <p:grpSp>
-        <p:nvGrpSpPr>
-          <p:cNvPr id="111" name="组合 110"/>
-          <p:cNvGrpSpPr/>
-          <p:nvPr/>
-        </p:nvGrpSpPr>
-        <p:grpSpPr>
-          <a:xfrm>
-            <a:off x="3668451" y="2368255"/>
-            <a:ext cx="328696" cy="620108"/>
-            <a:chOff x="4211821" y="518856"/>
-            <a:chExt cx="328696" cy="620108"/>
-          </a:xfrm>
-        </p:grpSpPr>
-        <p:cxnSp>
-          <p:nvCxnSpPr>
-            <p:cNvPr id="104" name="直接连接符 103"/>
-            <p:cNvCxnSpPr/>
-            <p:nvPr/>
-          </p:nvCxnSpPr>
-          <p:spPr>
-            <a:xfrm>
-              <a:off x="4211821" y="518856"/>
-              <a:ext cx="0" cy="620108"/>
-            </a:xfrm>
-            <a:prstGeom prst="line">
-              <a:avLst/>
-            </a:prstGeom>
-            <a:solidFill>
-              <a:schemeClr val="bg1"/>
-            </a:solidFill>
-            <a:ln>
-              <a:solidFill>
-                <a:srgbClr val="00B0F0"/>
-              </a:solidFill>
-            </a:ln>
-          </p:spPr>
-          <p:style>
-            <a:lnRef idx="2">
-              <a:schemeClr val="accent1">
-                <a:shade val="50000"/>
-              </a:schemeClr>
-            </a:lnRef>
-            <a:fillRef idx="1">
-              <a:schemeClr val="accent1"/>
-            </a:fillRef>
-            <a:effectRef idx="0">
-              <a:schemeClr val="accent1"/>
-            </a:effectRef>
-            <a:fontRef idx="minor">
-              <a:schemeClr val="lt1"/>
-            </a:fontRef>
-          </p:style>
-        </p:cxnSp>
-        <p:cxnSp>
-          <p:nvCxnSpPr>
-            <p:cNvPr id="108" name="直接箭头连接符 107"/>
-            <p:cNvCxnSpPr/>
-            <p:nvPr/>
-          </p:nvCxnSpPr>
-          <p:spPr>
-            <a:xfrm>
-              <a:off x="4211821" y="518856"/>
-              <a:ext cx="328696" cy="0"/>
-            </a:xfrm>
-            <a:prstGeom prst="straightConnector1">
-              <a:avLst/>
-            </a:prstGeom>
-            <a:solidFill>
-              <a:schemeClr val="bg1"/>
-            </a:solidFill>
-            <a:ln>
-              <a:solidFill>
-                <a:srgbClr val="00B0F0"/>
-              </a:solidFill>
-              <a:tailEnd type="triangle"/>
-            </a:ln>
-          </p:spPr>
-          <p:style>
-            <a:lnRef idx="2">
-              <a:schemeClr val="accent1">
-                <a:shade val="50000"/>
-              </a:schemeClr>
-            </a:lnRef>
-            <a:fillRef idx="1">
-              <a:schemeClr val="accent1"/>
-            </a:fillRef>
-            <a:effectRef idx="0">
-              <a:schemeClr val="accent1"/>
-            </a:effectRef>
-            <a:fontRef idx="minor">
-              <a:schemeClr val="lt1"/>
-            </a:fontRef>
-          </p:style>
-        </p:cxnSp>
-        <p:cxnSp>
-          <p:nvCxnSpPr>
-            <p:cNvPr id="110" name="直接连接符 109"/>
-            <p:cNvCxnSpPr/>
-            <p:nvPr/>
-          </p:nvCxnSpPr>
-          <p:spPr>
-            <a:xfrm>
-              <a:off x="4211821" y="1129204"/>
-              <a:ext cx="328696" cy="0"/>
-            </a:xfrm>
-            <a:prstGeom prst="line">
-              <a:avLst/>
-            </a:prstGeom>
-            <a:solidFill>
-              <a:schemeClr val="bg1"/>
-            </a:solidFill>
-            <a:ln>
-              <a:solidFill>
-                <a:srgbClr val="00B0F0"/>
-              </a:solidFill>
-            </a:ln>
-          </p:spPr>
-          <p:style>
-            <a:lnRef idx="2">
-              <a:schemeClr val="accent1">
-                <a:shade val="50000"/>
-              </a:schemeClr>
-            </a:lnRef>
-            <a:fillRef idx="1">
-              <a:schemeClr val="accent1"/>
-            </a:fillRef>
-            <a:effectRef idx="0">
-              <a:schemeClr val="accent1"/>
-            </a:effectRef>
-            <a:fontRef idx="minor">
-              <a:schemeClr val="lt1"/>
-            </a:fontRef>
-          </p:style>
-        </p:cxnSp>
-      </p:grpSp>
-      <p:sp>
-        <p:nvSpPr>
-          <p:cNvPr id="121" name="TextBox 120"/>
-          <p:cNvSpPr txBox="1"/>
-          <p:nvPr/>
-        </p:nvSpPr>
-        <p:spPr>
-          <a:xfrm>
-            <a:off x="2692477" y="2697536"/>
-            <a:ext cx="989438" cy="307777"/>
-          </a:xfrm>
-          <a:prstGeom prst="rect">
-            <a:avLst/>
-          </a:prstGeom>
-          <a:noFill/>
-        </p:spPr>
-        <p:txBody>
-          <a:bodyPr wrap="none" rtlCol="0">
-            <a:spAutoFit/>
-          </a:bodyPr>
-          <a:lstStyle/>
-          <a:p>
-            <a:r>
-              <a:rPr lang="en-US" altLang="zh-CN" sz="1400" b="1" dirty="0" smtClean="0">
-                <a:solidFill>
-                  <a:srgbClr val="0070C0"/>
-                </a:solidFill>
-              </a:rPr>
-              <a:t>_metadata</a:t>
-            </a:r>
-            <a:endParaRPr lang="zh-CN" altLang="en-US" sz="1400" b="1" dirty="0">
-              <a:solidFill>
-                <a:srgbClr val="0070C0"/>
-              </a:solidFill>
-            </a:endParaRPr>
-          </a:p>
-        </p:txBody>
-      </p:sp>
     </p:spTree>
     <p:extLst>
       <p:ext uri="{BB962C8B-B14F-4D97-AF65-F5344CB8AC3E}">

</xml_diff>